<commit_message>
Overhaul of geolocation button layout and functions
</commit_message>
<xml_diff>
--- a/3dwebclient/images/GPS_off.pptx
+++ b/3dwebclient/images/GPS_off.pptx
@@ -154,7 +154,7 @@
           </a:lstStyle>
           <a:p>
             <a:r>
-              <a:rPr lang="de-DE" smtClean="0"/>
+              <a:rPr lang="de-DE"/>
               <a:t>Titelmasterformat durch Klicken bearbeiten</a:t>
             </a:r>
             <a:endParaRPr lang="en-US"/>
@@ -219,7 +219,7 @@
           </a:lstStyle>
           <a:p>
             <a:r>
-              <a:rPr lang="de-DE" smtClean="0"/>
+              <a:rPr lang="de-DE"/>
               <a:t>Formatvorlage des Untertitelmasters durch Klicken bearbeiten</a:t>
             </a:r>
             <a:endParaRPr lang="en-US"/>
@@ -243,7 +243,7 @@
           <a:p>
             <a:fld id="{4631EFA2-06F7-4F07-9FD0-9BEA6FBA73D3}" type="datetimeFigureOut">
               <a:rPr lang="en-US" smtClean="0"/>
-              <a:t>8/8/2017</a:t>
+              <a:t>9/18/2024</a:t>
             </a:fld>
             <a:endParaRPr lang="en-US"/>
           </a:p>
@@ -285,7 +285,7 @@
           <a:p>
             <a:fld id="{E0A0E83A-DAF9-415B-BCB0-D9FC7C10ED75}" type="slidenum">
               <a:rPr lang="en-US" smtClean="0"/>
-              <a:t>‹Nr.›</a:t>
+              <a:t>‹#›</a:t>
             </a:fld>
             <a:endParaRPr lang="en-US"/>
           </a:p>
@@ -337,7 +337,7 @@
           <a:lstStyle/>
           <a:p>
             <a:r>
-              <a:rPr lang="de-DE" smtClean="0"/>
+              <a:rPr lang="de-DE"/>
               <a:t>Titelmasterformat durch Klicken bearbeiten</a:t>
             </a:r>
             <a:endParaRPr lang="en-US"/>
@@ -361,35 +361,35 @@
           <a:p>
             <a:pPr lvl="0"/>
             <a:r>
-              <a:rPr lang="de-DE" smtClean="0"/>
+              <a:rPr lang="de-DE"/>
               <a:t>Textmasterformat bearbeiten</a:t>
             </a:r>
           </a:p>
           <a:p>
             <a:pPr lvl="1"/>
             <a:r>
-              <a:rPr lang="de-DE" smtClean="0"/>
+              <a:rPr lang="de-DE"/>
               <a:t>Zweite Ebene</a:t>
             </a:r>
           </a:p>
           <a:p>
             <a:pPr lvl="2"/>
             <a:r>
-              <a:rPr lang="de-DE" smtClean="0"/>
+              <a:rPr lang="de-DE"/>
               <a:t>Dritte Ebene</a:t>
             </a:r>
           </a:p>
           <a:p>
             <a:pPr lvl="3"/>
             <a:r>
-              <a:rPr lang="de-DE" smtClean="0"/>
+              <a:rPr lang="de-DE"/>
               <a:t>Vierte Ebene</a:t>
             </a:r>
           </a:p>
           <a:p>
             <a:pPr lvl="4"/>
             <a:r>
-              <a:rPr lang="de-DE" smtClean="0"/>
+              <a:rPr lang="de-DE"/>
               <a:t>Fünfte Ebene</a:t>
             </a:r>
             <a:endParaRPr lang="en-US"/>
@@ -413,7 +413,7 @@
           <a:p>
             <a:fld id="{4631EFA2-06F7-4F07-9FD0-9BEA6FBA73D3}" type="datetimeFigureOut">
               <a:rPr lang="en-US" smtClean="0"/>
-              <a:t>8/8/2017</a:t>
+              <a:t>9/18/2024</a:t>
             </a:fld>
             <a:endParaRPr lang="en-US"/>
           </a:p>
@@ -455,7 +455,7 @@
           <a:p>
             <a:fld id="{E0A0E83A-DAF9-415B-BCB0-D9FC7C10ED75}" type="slidenum">
               <a:rPr lang="en-US" smtClean="0"/>
-              <a:t>‹Nr.›</a:t>
+              <a:t>‹#›</a:t>
             </a:fld>
             <a:endParaRPr lang="en-US"/>
           </a:p>
@@ -512,7 +512,7 @@
           <a:lstStyle/>
           <a:p>
             <a:r>
-              <a:rPr lang="de-DE" smtClean="0"/>
+              <a:rPr lang="de-DE"/>
               <a:t>Titelmasterformat durch Klicken bearbeiten</a:t>
             </a:r>
             <a:endParaRPr lang="en-US"/>
@@ -541,35 +541,35 @@
           <a:p>
             <a:pPr lvl="0"/>
             <a:r>
-              <a:rPr lang="de-DE" smtClean="0"/>
+              <a:rPr lang="de-DE"/>
               <a:t>Textmasterformat bearbeiten</a:t>
             </a:r>
           </a:p>
           <a:p>
             <a:pPr lvl="1"/>
             <a:r>
-              <a:rPr lang="de-DE" smtClean="0"/>
+              <a:rPr lang="de-DE"/>
               <a:t>Zweite Ebene</a:t>
             </a:r>
           </a:p>
           <a:p>
             <a:pPr lvl="2"/>
             <a:r>
-              <a:rPr lang="de-DE" smtClean="0"/>
+              <a:rPr lang="de-DE"/>
               <a:t>Dritte Ebene</a:t>
             </a:r>
           </a:p>
           <a:p>
             <a:pPr lvl="3"/>
             <a:r>
-              <a:rPr lang="de-DE" smtClean="0"/>
+              <a:rPr lang="de-DE"/>
               <a:t>Vierte Ebene</a:t>
             </a:r>
           </a:p>
           <a:p>
             <a:pPr lvl="4"/>
             <a:r>
-              <a:rPr lang="de-DE" smtClean="0"/>
+              <a:rPr lang="de-DE"/>
               <a:t>Fünfte Ebene</a:t>
             </a:r>
             <a:endParaRPr lang="en-US"/>
@@ -593,7 +593,7 @@
           <a:p>
             <a:fld id="{4631EFA2-06F7-4F07-9FD0-9BEA6FBA73D3}" type="datetimeFigureOut">
               <a:rPr lang="en-US" smtClean="0"/>
-              <a:t>8/8/2017</a:t>
+              <a:t>9/18/2024</a:t>
             </a:fld>
             <a:endParaRPr lang="en-US"/>
           </a:p>
@@ -635,7 +635,7 @@
           <a:p>
             <a:fld id="{E0A0E83A-DAF9-415B-BCB0-D9FC7C10ED75}" type="slidenum">
               <a:rPr lang="en-US" smtClean="0"/>
-              <a:t>‹Nr.›</a:t>
+              <a:t>‹#›</a:t>
             </a:fld>
             <a:endParaRPr lang="en-US"/>
           </a:p>
@@ -687,7 +687,7 @@
           <a:lstStyle/>
           <a:p>
             <a:r>
-              <a:rPr lang="de-DE" smtClean="0"/>
+              <a:rPr lang="de-DE"/>
               <a:t>Titelmasterformat durch Klicken bearbeiten</a:t>
             </a:r>
             <a:endParaRPr lang="en-US"/>
@@ -711,35 +711,35 @@
           <a:p>
             <a:pPr lvl="0"/>
             <a:r>
-              <a:rPr lang="de-DE" smtClean="0"/>
+              <a:rPr lang="de-DE"/>
               <a:t>Textmasterformat bearbeiten</a:t>
             </a:r>
           </a:p>
           <a:p>
             <a:pPr lvl="1"/>
             <a:r>
-              <a:rPr lang="de-DE" smtClean="0"/>
+              <a:rPr lang="de-DE"/>
               <a:t>Zweite Ebene</a:t>
             </a:r>
           </a:p>
           <a:p>
             <a:pPr lvl="2"/>
             <a:r>
-              <a:rPr lang="de-DE" smtClean="0"/>
+              <a:rPr lang="de-DE"/>
               <a:t>Dritte Ebene</a:t>
             </a:r>
           </a:p>
           <a:p>
             <a:pPr lvl="3"/>
             <a:r>
-              <a:rPr lang="de-DE" smtClean="0"/>
+              <a:rPr lang="de-DE"/>
               <a:t>Vierte Ebene</a:t>
             </a:r>
           </a:p>
           <a:p>
             <a:pPr lvl="4"/>
             <a:r>
-              <a:rPr lang="de-DE" smtClean="0"/>
+              <a:rPr lang="de-DE"/>
               <a:t>Fünfte Ebene</a:t>
             </a:r>
             <a:endParaRPr lang="en-US"/>
@@ -763,7 +763,7 @@
           <a:p>
             <a:fld id="{4631EFA2-06F7-4F07-9FD0-9BEA6FBA73D3}" type="datetimeFigureOut">
               <a:rPr lang="en-US" smtClean="0"/>
-              <a:t>8/8/2017</a:t>
+              <a:t>9/18/2024</a:t>
             </a:fld>
             <a:endParaRPr lang="en-US"/>
           </a:p>
@@ -805,7 +805,7 @@
           <a:p>
             <a:fld id="{E0A0E83A-DAF9-415B-BCB0-D9FC7C10ED75}" type="slidenum">
               <a:rPr lang="en-US" smtClean="0"/>
-              <a:t>‹Nr.›</a:t>
+              <a:t>‹#›</a:t>
             </a:fld>
             <a:endParaRPr lang="en-US"/>
           </a:p>
@@ -866,7 +866,7 @@
           </a:lstStyle>
           <a:p>
             <a:r>
-              <a:rPr lang="de-DE" smtClean="0"/>
+              <a:rPr lang="de-DE"/>
               <a:t>Titelmasterformat durch Klicken bearbeiten</a:t>
             </a:r>
             <a:endParaRPr lang="en-US"/>
@@ -986,7 +986,7 @@
           <a:p>
             <a:pPr lvl="0"/>
             <a:r>
-              <a:rPr lang="de-DE" smtClean="0"/>
+              <a:rPr lang="de-DE"/>
               <a:t>Textmasterformat bearbeiten</a:t>
             </a:r>
           </a:p>
@@ -1009,7 +1009,7 @@
           <a:p>
             <a:fld id="{4631EFA2-06F7-4F07-9FD0-9BEA6FBA73D3}" type="datetimeFigureOut">
               <a:rPr lang="en-US" smtClean="0"/>
-              <a:t>8/8/2017</a:t>
+              <a:t>9/18/2024</a:t>
             </a:fld>
             <a:endParaRPr lang="en-US"/>
           </a:p>
@@ -1051,7 +1051,7 @@
           <a:p>
             <a:fld id="{E0A0E83A-DAF9-415B-BCB0-D9FC7C10ED75}" type="slidenum">
               <a:rPr lang="en-US" smtClean="0"/>
-              <a:t>‹Nr.›</a:t>
+              <a:t>‹#›</a:t>
             </a:fld>
             <a:endParaRPr lang="en-US"/>
           </a:p>
@@ -1103,7 +1103,7 @@
           <a:lstStyle/>
           <a:p>
             <a:r>
-              <a:rPr lang="de-DE" smtClean="0"/>
+              <a:rPr lang="de-DE"/>
               <a:t>Titelmasterformat durch Klicken bearbeiten</a:t>
             </a:r>
             <a:endParaRPr lang="en-US"/>
@@ -1132,35 +1132,35 @@
           <a:p>
             <a:pPr lvl="0"/>
             <a:r>
-              <a:rPr lang="de-DE" smtClean="0"/>
+              <a:rPr lang="de-DE"/>
               <a:t>Textmasterformat bearbeiten</a:t>
             </a:r>
           </a:p>
           <a:p>
             <a:pPr lvl="1"/>
             <a:r>
-              <a:rPr lang="de-DE" smtClean="0"/>
+              <a:rPr lang="de-DE"/>
               <a:t>Zweite Ebene</a:t>
             </a:r>
           </a:p>
           <a:p>
             <a:pPr lvl="2"/>
             <a:r>
-              <a:rPr lang="de-DE" smtClean="0"/>
+              <a:rPr lang="de-DE"/>
               <a:t>Dritte Ebene</a:t>
             </a:r>
           </a:p>
           <a:p>
             <a:pPr lvl="3"/>
             <a:r>
-              <a:rPr lang="de-DE" smtClean="0"/>
+              <a:rPr lang="de-DE"/>
               <a:t>Vierte Ebene</a:t>
             </a:r>
           </a:p>
           <a:p>
             <a:pPr lvl="4"/>
             <a:r>
-              <a:rPr lang="de-DE" smtClean="0"/>
+              <a:rPr lang="de-DE"/>
               <a:t>Fünfte Ebene</a:t>
             </a:r>
             <a:endParaRPr lang="en-US"/>
@@ -1189,35 +1189,35 @@
           <a:p>
             <a:pPr lvl="0"/>
             <a:r>
-              <a:rPr lang="de-DE" smtClean="0"/>
+              <a:rPr lang="de-DE"/>
               <a:t>Textmasterformat bearbeiten</a:t>
             </a:r>
           </a:p>
           <a:p>
             <a:pPr lvl="1"/>
             <a:r>
-              <a:rPr lang="de-DE" smtClean="0"/>
+              <a:rPr lang="de-DE"/>
               <a:t>Zweite Ebene</a:t>
             </a:r>
           </a:p>
           <a:p>
             <a:pPr lvl="2"/>
             <a:r>
-              <a:rPr lang="de-DE" smtClean="0"/>
+              <a:rPr lang="de-DE"/>
               <a:t>Dritte Ebene</a:t>
             </a:r>
           </a:p>
           <a:p>
             <a:pPr lvl="3"/>
             <a:r>
-              <a:rPr lang="de-DE" smtClean="0"/>
+              <a:rPr lang="de-DE"/>
               <a:t>Vierte Ebene</a:t>
             </a:r>
           </a:p>
           <a:p>
             <a:pPr lvl="4"/>
             <a:r>
-              <a:rPr lang="de-DE" smtClean="0"/>
+              <a:rPr lang="de-DE"/>
               <a:t>Fünfte Ebene</a:t>
             </a:r>
             <a:endParaRPr lang="en-US"/>
@@ -1241,7 +1241,7 @@
           <a:p>
             <a:fld id="{4631EFA2-06F7-4F07-9FD0-9BEA6FBA73D3}" type="datetimeFigureOut">
               <a:rPr lang="en-US" smtClean="0"/>
-              <a:t>8/8/2017</a:t>
+              <a:t>9/18/2024</a:t>
             </a:fld>
             <a:endParaRPr lang="en-US"/>
           </a:p>
@@ -1283,7 +1283,7 @@
           <a:p>
             <a:fld id="{E0A0E83A-DAF9-415B-BCB0-D9FC7C10ED75}" type="slidenum">
               <a:rPr lang="en-US" smtClean="0"/>
-              <a:t>‹Nr.›</a:t>
+              <a:t>‹#›</a:t>
             </a:fld>
             <a:endParaRPr lang="en-US"/>
           </a:p>
@@ -1340,7 +1340,7 @@
           <a:lstStyle/>
           <a:p>
             <a:r>
-              <a:rPr lang="de-DE" smtClean="0"/>
+              <a:rPr lang="de-DE"/>
               <a:t>Titelmasterformat durch Klicken bearbeiten</a:t>
             </a:r>
             <a:endParaRPr lang="en-US"/>
@@ -1406,7 +1406,7 @@
           <a:p>
             <a:pPr lvl="0"/>
             <a:r>
-              <a:rPr lang="de-DE" smtClean="0"/>
+              <a:rPr lang="de-DE"/>
               <a:t>Textmasterformat bearbeiten</a:t>
             </a:r>
           </a:p>
@@ -1434,35 +1434,35 @@
           <a:p>
             <a:pPr lvl="0"/>
             <a:r>
-              <a:rPr lang="de-DE" smtClean="0"/>
+              <a:rPr lang="de-DE"/>
               <a:t>Textmasterformat bearbeiten</a:t>
             </a:r>
           </a:p>
           <a:p>
             <a:pPr lvl="1"/>
             <a:r>
-              <a:rPr lang="de-DE" smtClean="0"/>
+              <a:rPr lang="de-DE"/>
               <a:t>Zweite Ebene</a:t>
             </a:r>
           </a:p>
           <a:p>
             <a:pPr lvl="2"/>
             <a:r>
-              <a:rPr lang="de-DE" smtClean="0"/>
+              <a:rPr lang="de-DE"/>
               <a:t>Dritte Ebene</a:t>
             </a:r>
           </a:p>
           <a:p>
             <a:pPr lvl="3"/>
             <a:r>
-              <a:rPr lang="de-DE" smtClean="0"/>
+              <a:rPr lang="de-DE"/>
               <a:t>Vierte Ebene</a:t>
             </a:r>
           </a:p>
           <a:p>
             <a:pPr lvl="4"/>
             <a:r>
-              <a:rPr lang="de-DE" smtClean="0"/>
+              <a:rPr lang="de-DE"/>
               <a:t>Fünfte Ebene</a:t>
             </a:r>
             <a:endParaRPr lang="en-US"/>
@@ -1528,7 +1528,7 @@
           <a:p>
             <a:pPr lvl="0"/>
             <a:r>
-              <a:rPr lang="de-DE" smtClean="0"/>
+              <a:rPr lang="de-DE"/>
               <a:t>Textmasterformat bearbeiten</a:t>
             </a:r>
           </a:p>
@@ -1556,35 +1556,35 @@
           <a:p>
             <a:pPr lvl="0"/>
             <a:r>
-              <a:rPr lang="de-DE" smtClean="0"/>
+              <a:rPr lang="de-DE"/>
               <a:t>Textmasterformat bearbeiten</a:t>
             </a:r>
           </a:p>
           <a:p>
             <a:pPr lvl="1"/>
             <a:r>
-              <a:rPr lang="de-DE" smtClean="0"/>
+              <a:rPr lang="de-DE"/>
               <a:t>Zweite Ebene</a:t>
             </a:r>
           </a:p>
           <a:p>
             <a:pPr lvl="2"/>
             <a:r>
-              <a:rPr lang="de-DE" smtClean="0"/>
+              <a:rPr lang="de-DE"/>
               <a:t>Dritte Ebene</a:t>
             </a:r>
           </a:p>
           <a:p>
             <a:pPr lvl="3"/>
             <a:r>
-              <a:rPr lang="de-DE" smtClean="0"/>
+              <a:rPr lang="de-DE"/>
               <a:t>Vierte Ebene</a:t>
             </a:r>
           </a:p>
           <a:p>
             <a:pPr lvl="4"/>
             <a:r>
-              <a:rPr lang="de-DE" smtClean="0"/>
+              <a:rPr lang="de-DE"/>
               <a:t>Fünfte Ebene</a:t>
             </a:r>
             <a:endParaRPr lang="en-US"/>
@@ -1608,7 +1608,7 @@
           <a:p>
             <a:fld id="{4631EFA2-06F7-4F07-9FD0-9BEA6FBA73D3}" type="datetimeFigureOut">
               <a:rPr lang="en-US" smtClean="0"/>
-              <a:t>8/8/2017</a:t>
+              <a:t>9/18/2024</a:t>
             </a:fld>
             <a:endParaRPr lang="en-US"/>
           </a:p>
@@ -1650,7 +1650,7 @@
           <a:p>
             <a:fld id="{E0A0E83A-DAF9-415B-BCB0-D9FC7C10ED75}" type="slidenum">
               <a:rPr lang="en-US" smtClean="0"/>
-              <a:t>‹Nr.›</a:t>
+              <a:t>‹#›</a:t>
             </a:fld>
             <a:endParaRPr lang="en-US"/>
           </a:p>
@@ -1702,7 +1702,7 @@
           <a:lstStyle/>
           <a:p>
             <a:r>
-              <a:rPr lang="de-DE" smtClean="0"/>
+              <a:rPr lang="de-DE"/>
               <a:t>Titelmasterformat durch Klicken bearbeiten</a:t>
             </a:r>
             <a:endParaRPr lang="en-US"/>
@@ -1726,7 +1726,7 @@
           <a:p>
             <a:fld id="{4631EFA2-06F7-4F07-9FD0-9BEA6FBA73D3}" type="datetimeFigureOut">
               <a:rPr lang="en-US" smtClean="0"/>
-              <a:t>8/8/2017</a:t>
+              <a:t>9/18/2024</a:t>
             </a:fld>
             <a:endParaRPr lang="en-US"/>
           </a:p>
@@ -1768,7 +1768,7 @@
           <a:p>
             <a:fld id="{E0A0E83A-DAF9-415B-BCB0-D9FC7C10ED75}" type="slidenum">
               <a:rPr lang="en-US" smtClean="0"/>
-              <a:t>‹Nr.›</a:t>
+              <a:t>‹#›</a:t>
             </a:fld>
             <a:endParaRPr lang="en-US"/>
           </a:p>
@@ -1821,7 +1821,7 @@
           <a:p>
             <a:fld id="{4631EFA2-06F7-4F07-9FD0-9BEA6FBA73D3}" type="datetimeFigureOut">
               <a:rPr lang="en-US" smtClean="0"/>
-              <a:t>8/8/2017</a:t>
+              <a:t>9/18/2024</a:t>
             </a:fld>
             <a:endParaRPr lang="en-US"/>
           </a:p>
@@ -1863,7 +1863,7 @@
           <a:p>
             <a:fld id="{E0A0E83A-DAF9-415B-BCB0-D9FC7C10ED75}" type="slidenum">
               <a:rPr lang="en-US" smtClean="0"/>
-              <a:t>‹Nr.›</a:t>
+              <a:t>‹#›</a:t>
             </a:fld>
             <a:endParaRPr lang="en-US"/>
           </a:p>
@@ -1924,7 +1924,7 @@
           </a:lstStyle>
           <a:p>
             <a:r>
-              <a:rPr lang="de-DE" smtClean="0"/>
+              <a:rPr lang="de-DE"/>
               <a:t>Titelmasterformat durch Klicken bearbeiten</a:t>
             </a:r>
             <a:endParaRPr lang="en-US"/>
@@ -1981,35 +1981,35 @@
           <a:p>
             <a:pPr lvl="0"/>
             <a:r>
-              <a:rPr lang="de-DE" smtClean="0"/>
+              <a:rPr lang="de-DE"/>
               <a:t>Textmasterformat bearbeiten</a:t>
             </a:r>
           </a:p>
           <a:p>
             <a:pPr lvl="1"/>
             <a:r>
-              <a:rPr lang="de-DE" smtClean="0"/>
+              <a:rPr lang="de-DE"/>
               <a:t>Zweite Ebene</a:t>
             </a:r>
           </a:p>
           <a:p>
             <a:pPr lvl="2"/>
             <a:r>
-              <a:rPr lang="de-DE" smtClean="0"/>
+              <a:rPr lang="de-DE"/>
               <a:t>Dritte Ebene</a:t>
             </a:r>
           </a:p>
           <a:p>
             <a:pPr lvl="3"/>
             <a:r>
-              <a:rPr lang="de-DE" smtClean="0"/>
+              <a:rPr lang="de-DE"/>
               <a:t>Vierte Ebene</a:t>
             </a:r>
           </a:p>
           <a:p>
             <a:pPr lvl="4"/>
             <a:r>
-              <a:rPr lang="de-DE" smtClean="0"/>
+              <a:rPr lang="de-DE"/>
               <a:t>Fünfte Ebene</a:t>
             </a:r>
             <a:endParaRPr lang="en-US"/>
@@ -2075,7 +2075,7 @@
           <a:p>
             <a:pPr lvl="0"/>
             <a:r>
-              <a:rPr lang="de-DE" smtClean="0"/>
+              <a:rPr lang="de-DE"/>
               <a:t>Textmasterformat bearbeiten</a:t>
             </a:r>
           </a:p>
@@ -2098,7 +2098,7 @@
           <a:p>
             <a:fld id="{4631EFA2-06F7-4F07-9FD0-9BEA6FBA73D3}" type="datetimeFigureOut">
               <a:rPr lang="en-US" smtClean="0"/>
-              <a:t>8/8/2017</a:t>
+              <a:t>9/18/2024</a:t>
             </a:fld>
             <a:endParaRPr lang="en-US"/>
           </a:p>
@@ -2140,7 +2140,7 @@
           <a:p>
             <a:fld id="{E0A0E83A-DAF9-415B-BCB0-D9FC7C10ED75}" type="slidenum">
               <a:rPr lang="en-US" smtClean="0"/>
-              <a:t>‹Nr.›</a:t>
+              <a:t>‹#›</a:t>
             </a:fld>
             <a:endParaRPr lang="en-US"/>
           </a:p>
@@ -2201,7 +2201,7 @@
           </a:lstStyle>
           <a:p>
             <a:r>
-              <a:rPr lang="de-DE" smtClean="0"/>
+              <a:rPr lang="de-DE"/>
               <a:t>Titelmasterformat durch Klicken bearbeiten</a:t>
             </a:r>
             <a:endParaRPr lang="en-US"/>
@@ -2328,7 +2328,7 @@
           <a:p>
             <a:pPr lvl="0"/>
             <a:r>
-              <a:rPr lang="de-DE" smtClean="0"/>
+              <a:rPr lang="de-DE"/>
               <a:t>Textmasterformat bearbeiten</a:t>
             </a:r>
           </a:p>
@@ -2351,7 +2351,7 @@
           <a:p>
             <a:fld id="{4631EFA2-06F7-4F07-9FD0-9BEA6FBA73D3}" type="datetimeFigureOut">
               <a:rPr lang="en-US" smtClean="0"/>
-              <a:t>8/8/2017</a:t>
+              <a:t>9/18/2024</a:t>
             </a:fld>
             <a:endParaRPr lang="en-US"/>
           </a:p>
@@ -2393,7 +2393,7 @@
           <a:p>
             <a:fld id="{E0A0E83A-DAF9-415B-BCB0-D9FC7C10ED75}" type="slidenum">
               <a:rPr lang="en-US" smtClean="0"/>
-              <a:t>‹Nr.›</a:t>
+              <a:t>‹#›</a:t>
             </a:fld>
             <a:endParaRPr lang="en-US"/>
           </a:p>
@@ -2460,7 +2460,7 @@
           <a:lstStyle/>
           <a:p>
             <a:r>
-              <a:rPr lang="de-DE" smtClean="0"/>
+              <a:rPr lang="de-DE"/>
               <a:t>Titelmasterformat durch Klicken bearbeiten</a:t>
             </a:r>
             <a:endParaRPr lang="en-US"/>
@@ -2494,35 +2494,35 @@
           <a:p>
             <a:pPr lvl="0"/>
             <a:r>
-              <a:rPr lang="de-DE" smtClean="0"/>
+              <a:rPr lang="de-DE"/>
               <a:t>Textmasterformat bearbeiten</a:t>
             </a:r>
           </a:p>
           <a:p>
             <a:pPr lvl="1"/>
             <a:r>
-              <a:rPr lang="de-DE" smtClean="0"/>
+              <a:rPr lang="de-DE"/>
               <a:t>Zweite Ebene</a:t>
             </a:r>
           </a:p>
           <a:p>
             <a:pPr lvl="2"/>
             <a:r>
-              <a:rPr lang="de-DE" smtClean="0"/>
+              <a:rPr lang="de-DE"/>
               <a:t>Dritte Ebene</a:t>
             </a:r>
           </a:p>
           <a:p>
             <a:pPr lvl="3"/>
             <a:r>
-              <a:rPr lang="de-DE" smtClean="0"/>
+              <a:rPr lang="de-DE"/>
               <a:t>Vierte Ebene</a:t>
             </a:r>
           </a:p>
           <a:p>
             <a:pPr lvl="4"/>
             <a:r>
-              <a:rPr lang="de-DE" smtClean="0"/>
+              <a:rPr lang="de-DE"/>
               <a:t>Fünfte Ebene</a:t>
             </a:r>
             <a:endParaRPr lang="en-US"/>
@@ -2564,7 +2564,7 @@
           <a:p>
             <a:fld id="{4631EFA2-06F7-4F07-9FD0-9BEA6FBA73D3}" type="datetimeFigureOut">
               <a:rPr lang="en-US" smtClean="0"/>
-              <a:t>8/8/2017</a:t>
+              <a:t>9/18/2024</a:t>
             </a:fld>
             <a:endParaRPr lang="en-US"/>
           </a:p>
@@ -2642,7 +2642,7 @@
           <a:p>
             <a:fld id="{E0A0E83A-DAF9-415B-BCB0-D9FC7C10ED75}" type="slidenum">
               <a:rPr lang="en-US" smtClean="0"/>
-              <a:t>‹Nr.›</a:t>
+              <a:t>‹#›</a:t>
             </a:fld>
             <a:endParaRPr lang="en-US"/>
           </a:p>
@@ -2971,7 +2971,13 @@
       </p:grpSpPr>
       <p:grpSp>
         <p:nvGrpSpPr>
-          <p:cNvPr id="36" name="Gruppieren 35"/>
+          <p:cNvPr id="3" name="Group 2">
+            <a:extLst>
+              <a:ext uri="{FF2B5EF4-FFF2-40B4-BE49-F238E27FC236}">
+                <a16:creationId xmlns:a16="http://schemas.microsoft.com/office/drawing/2014/main" id="{143F8F89-4733-C657-6CD0-EDCE729D6C6D}"/>
+              </a:ext>
+            </a:extLst>
+          </p:cNvPr>
           <p:cNvGrpSpPr/>
           <p:nvPr/>
         </p:nvGrpSpPr>
@@ -3031,33 +3037,193 @@
             </a:p>
           </p:txBody>
         </p:sp>
+        <p:grpSp>
+          <p:nvGrpSpPr>
+            <p:cNvPr id="10" name="Gruppieren 9"/>
+            <p:cNvGrpSpPr/>
+            <p:nvPr/>
+          </p:nvGrpSpPr>
+          <p:grpSpPr>
+            <a:xfrm>
+              <a:off x="3011879" y="1037606"/>
+              <a:ext cx="5219205" cy="5219205"/>
+              <a:chOff x="3633850" y="706582"/>
+              <a:chExt cx="5219205" cy="5219205"/>
+            </a:xfrm>
+          </p:grpSpPr>
+          <p:sp>
+            <p:nvSpPr>
+              <p:cNvPr id="4" name="Ellipse 3"/>
+              <p:cNvSpPr/>
+              <p:nvPr/>
+            </p:nvSpPr>
+            <p:spPr>
+              <a:xfrm>
+                <a:off x="3633850" y="706582"/>
+                <a:ext cx="5219205" cy="5219205"/>
+              </a:xfrm>
+              <a:prstGeom prst="ellipse">
+                <a:avLst/>
+              </a:prstGeom>
+              <a:solidFill>
+                <a:srgbClr val="EDFFFF"/>
+              </a:solidFill>
+              <a:ln w="38100">
+                <a:solidFill>
+                  <a:srgbClr val="303336"/>
+                </a:solidFill>
+              </a:ln>
+            </p:spPr>
+            <p:style>
+              <a:lnRef idx="2">
+                <a:schemeClr val="accent1">
+                  <a:shade val="50000"/>
+                </a:schemeClr>
+              </a:lnRef>
+              <a:fillRef idx="1">
+                <a:schemeClr val="accent1"/>
+              </a:fillRef>
+              <a:effectRef idx="0">
+                <a:schemeClr val="accent1"/>
+              </a:effectRef>
+              <a:fontRef idx="minor">
+                <a:schemeClr val="lt1"/>
+              </a:fontRef>
+            </p:style>
+            <p:txBody>
+              <a:bodyPr rtlCol="0" anchor="ctr"/>
+              <a:lstStyle/>
+              <a:p>
+                <a:pPr algn="ctr"/>
+                <a:endParaRPr lang="en-US"/>
+              </a:p>
+            </p:txBody>
+          </p:sp>
+          <p:sp>
+            <p:nvSpPr>
+              <p:cNvPr id="9" name="Ellipse 8"/>
+              <p:cNvSpPr/>
+              <p:nvPr/>
+            </p:nvSpPr>
+            <p:spPr>
+              <a:xfrm>
+                <a:off x="4368142" y="1440873"/>
+                <a:ext cx="3750620" cy="3750620"/>
+              </a:xfrm>
+              <a:prstGeom prst="ellipse">
+                <a:avLst/>
+              </a:prstGeom>
+              <a:solidFill>
+                <a:srgbClr val="303336"/>
+              </a:solidFill>
+              <a:ln w="28575">
+                <a:solidFill>
+                  <a:srgbClr val="303336"/>
+                </a:solidFill>
+              </a:ln>
+            </p:spPr>
+            <p:style>
+              <a:lnRef idx="2">
+                <a:schemeClr val="accent1">
+                  <a:shade val="50000"/>
+                </a:schemeClr>
+              </a:lnRef>
+              <a:fillRef idx="1">
+                <a:schemeClr val="accent1"/>
+              </a:fillRef>
+              <a:effectRef idx="0">
+                <a:schemeClr val="accent1"/>
+              </a:effectRef>
+              <a:fontRef idx="minor">
+                <a:schemeClr val="lt1"/>
+              </a:fontRef>
+            </p:style>
+            <p:txBody>
+              <a:bodyPr rtlCol="0" anchor="ctr"/>
+              <a:lstStyle/>
+              <a:p>
+                <a:pPr algn="ctr"/>
+                <a:endParaRPr lang="en-US"/>
+              </a:p>
+            </p:txBody>
+          </p:sp>
+          <p:sp>
+            <p:nvSpPr>
+              <p:cNvPr id="7" name="Ellipse 6"/>
+              <p:cNvSpPr/>
+              <p:nvPr/>
+            </p:nvSpPr>
+            <p:spPr>
+              <a:xfrm>
+                <a:off x="5829796" y="2902527"/>
+                <a:ext cx="827312" cy="827312"/>
+              </a:xfrm>
+              <a:prstGeom prst="ellipse">
+                <a:avLst/>
+              </a:prstGeom>
+              <a:solidFill>
+                <a:srgbClr val="EDFFFF"/>
+              </a:solidFill>
+              <a:ln>
+                <a:solidFill>
+                  <a:srgbClr val="303336"/>
+                </a:solidFill>
+              </a:ln>
+            </p:spPr>
+            <p:style>
+              <a:lnRef idx="2">
+                <a:schemeClr val="accent1">
+                  <a:shade val="50000"/>
+                </a:schemeClr>
+              </a:lnRef>
+              <a:fillRef idx="1">
+                <a:schemeClr val="accent1"/>
+              </a:fillRef>
+              <a:effectRef idx="0">
+                <a:schemeClr val="accent1"/>
+              </a:effectRef>
+              <a:fontRef idx="minor">
+                <a:schemeClr val="lt1"/>
+              </a:fontRef>
+            </p:style>
+            <p:txBody>
+              <a:bodyPr rtlCol="0" anchor="ctr"/>
+              <a:lstStyle/>
+              <a:p>
+                <a:pPr algn="ctr"/>
+                <a:endParaRPr lang="en-US"/>
+              </a:p>
+            </p:txBody>
+          </p:sp>
+        </p:grpSp>
         <p:sp>
           <p:nvSpPr>
-            <p:cNvPr id="7" name="Ellipse 6"/>
+            <p:cNvPr id="2" name="Multiplication Sign 1">
+              <a:extLst>
+                <a:ext uri="{FF2B5EF4-FFF2-40B4-BE49-F238E27FC236}">
+                  <a16:creationId xmlns:a16="http://schemas.microsoft.com/office/drawing/2014/main" id="{36E8C7F2-D14F-0672-4EAB-3AE53BDEC36E}"/>
+                </a:ext>
+              </a:extLst>
+            </p:cNvPr>
             <p:cNvSpPr/>
             <p:nvPr/>
           </p:nvSpPr>
           <p:spPr>
             <a:xfrm>
-              <a:off x="5207825" y="3233551"/>
-              <a:ext cx="827312" cy="827312"/>
+              <a:off x="3471681" y="1497407"/>
+              <a:ext cx="4299600" cy="4299600"/>
             </a:xfrm>
-            <a:prstGeom prst="ellipse">
+            <a:prstGeom prst="mathMultiply">
               <a:avLst/>
             </a:prstGeom>
             <a:solidFill>
-              <a:srgbClr val="303336"/>
+              <a:srgbClr val="FFC000"/>
             </a:solidFill>
-            <a:ln>
-              <a:solidFill>
-                <a:srgbClr val="303336"/>
-              </a:solidFill>
-            </a:ln>
           </p:spPr>
           <p:style>
             <a:lnRef idx="2">
               <a:schemeClr val="accent1">
-                <a:shade val="50000"/>
+                <a:shade val="15000"/>
               </a:schemeClr>
             </a:lnRef>
             <a:fillRef idx="1">
@@ -3075,310 +3241,7 @@
             <a:lstStyle/>
             <a:p>
               <a:pPr algn="ctr"/>
-              <a:endParaRPr lang="en-US"/>
-            </a:p>
-          </p:txBody>
-        </p:sp>
-        <p:sp>
-          <p:nvSpPr>
-            <p:cNvPr id="2" name="Abgerundetes Rechteck 1"/>
-            <p:cNvSpPr/>
-            <p:nvPr/>
-          </p:nvSpPr>
-          <p:spPr>
-            <a:xfrm rot="2700000">
-              <a:off x="3294513" y="2126594"/>
-              <a:ext cx="3278384" cy="1665672"/>
-            </a:xfrm>
-            <a:prstGeom prst="roundRect">
-              <a:avLst/>
-            </a:prstGeom>
-            <a:solidFill>
-              <a:srgbClr val="EDFFFF"/>
-            </a:solidFill>
-            <a:ln w="38100">
-              <a:solidFill>
-                <a:srgbClr val="303336"/>
-              </a:solidFill>
-            </a:ln>
-          </p:spPr>
-          <p:style>
-            <a:lnRef idx="2">
-              <a:schemeClr val="accent1">
-                <a:shade val="50000"/>
-              </a:schemeClr>
-            </a:lnRef>
-            <a:fillRef idx="1">
-              <a:schemeClr val="accent1"/>
-            </a:fillRef>
-            <a:effectRef idx="0">
-              <a:schemeClr val="accent1"/>
-            </a:effectRef>
-            <a:fontRef idx="minor">
-              <a:schemeClr val="lt1"/>
-            </a:fontRef>
-          </p:style>
-          <p:txBody>
-            <a:bodyPr rtlCol="0" anchor="ctr"/>
-            <a:lstStyle/>
-            <a:p>
-              <a:pPr algn="ctr"/>
-              <a:endParaRPr lang="en-US"/>
-            </a:p>
-          </p:txBody>
-        </p:sp>
-        <p:sp>
-          <p:nvSpPr>
-            <p:cNvPr id="13" name="Abgerundetes Rechteck 12"/>
-            <p:cNvSpPr/>
-            <p:nvPr/>
-          </p:nvSpPr>
-          <p:spPr>
-            <a:xfrm rot="2700000">
-              <a:off x="3532200" y="3981606"/>
-              <a:ext cx="1367409" cy="1665672"/>
-            </a:xfrm>
-            <a:prstGeom prst="roundRect">
-              <a:avLst/>
-            </a:prstGeom>
-            <a:solidFill>
-              <a:srgbClr val="EDFFFF"/>
-            </a:solidFill>
-            <a:ln w="38100">
-              <a:solidFill>
-                <a:srgbClr val="303336"/>
-              </a:solidFill>
-            </a:ln>
-          </p:spPr>
-          <p:style>
-            <a:lnRef idx="2">
-              <a:schemeClr val="accent1">
-                <a:shade val="50000"/>
-              </a:schemeClr>
-            </a:lnRef>
-            <a:fillRef idx="1">
-              <a:schemeClr val="accent1"/>
-            </a:fillRef>
-            <a:effectRef idx="0">
-              <a:schemeClr val="accent1"/>
-            </a:effectRef>
-            <a:fontRef idx="minor">
-              <a:schemeClr val="lt1"/>
-            </a:fontRef>
-          </p:style>
-          <p:txBody>
-            <a:bodyPr rtlCol="0" anchor="ctr"/>
-            <a:lstStyle/>
-            <a:p>
-              <a:pPr algn="ctr"/>
-              <a:endParaRPr lang="en-US"/>
-            </a:p>
-          </p:txBody>
-        </p:sp>
-        <p:sp>
-          <p:nvSpPr>
-            <p:cNvPr id="14" name="Abgerundetes Rechteck 13"/>
-            <p:cNvSpPr/>
-            <p:nvPr/>
-          </p:nvSpPr>
-          <p:spPr>
-            <a:xfrm rot="2700000">
-              <a:off x="6105011" y="1408793"/>
-              <a:ext cx="1367409" cy="1665672"/>
-            </a:xfrm>
-            <a:prstGeom prst="roundRect">
-              <a:avLst/>
-            </a:prstGeom>
-            <a:solidFill>
-              <a:srgbClr val="EDFFFF"/>
-            </a:solidFill>
-            <a:ln w="38100">
-              <a:solidFill>
-                <a:srgbClr val="303336"/>
-              </a:solidFill>
-            </a:ln>
-          </p:spPr>
-          <p:style>
-            <a:lnRef idx="2">
-              <a:schemeClr val="accent1">
-                <a:shade val="50000"/>
-              </a:schemeClr>
-            </a:lnRef>
-            <a:fillRef idx="1">
-              <a:schemeClr val="accent1"/>
-            </a:fillRef>
-            <a:effectRef idx="0">
-              <a:schemeClr val="accent1"/>
-            </a:effectRef>
-            <a:fontRef idx="minor">
-              <a:schemeClr val="lt1"/>
-            </a:fontRef>
-          </p:style>
-          <p:txBody>
-            <a:bodyPr rtlCol="0" anchor="ctr"/>
-            <a:lstStyle/>
-            <a:p>
-              <a:pPr algn="ctr"/>
-              <a:endParaRPr lang="en-US"/>
-            </a:p>
-          </p:txBody>
-        </p:sp>
-        <p:sp>
-          <p:nvSpPr>
-            <p:cNvPr id="31" name="Bogen 30"/>
-            <p:cNvSpPr/>
-            <p:nvPr/>
-          </p:nvSpPr>
-          <p:spPr>
-            <a:xfrm rot="8100000">
-              <a:off x="5383711" y="3492386"/>
-              <a:ext cx="1599696" cy="1435604"/>
-            </a:xfrm>
-            <a:prstGeom prst="arc">
-              <a:avLst>
-                <a:gd name="adj1" fmla="val 14097675"/>
-                <a:gd name="adj2" fmla="val 18331547"/>
-              </a:avLst>
-            </a:prstGeom>
-            <a:noFill/>
-            <a:ln w="317500">
-              <a:solidFill>
-                <a:srgbClr val="EDFFFF"/>
-              </a:solidFill>
-            </a:ln>
-          </p:spPr>
-          <p:style>
-            <a:lnRef idx="2">
-              <a:schemeClr val="accent1">
-                <a:shade val="50000"/>
-              </a:schemeClr>
-            </a:lnRef>
-            <a:fillRef idx="1">
-              <a:schemeClr val="accent1"/>
-            </a:fillRef>
-            <a:effectRef idx="0">
-              <a:schemeClr val="accent1"/>
-            </a:effectRef>
-            <a:fontRef idx="minor">
-              <a:schemeClr val="lt1"/>
-            </a:fontRef>
-          </p:style>
-          <p:txBody>
-            <a:bodyPr rtlCol="0" anchor="ctr"/>
-            <a:lstStyle/>
-            <a:p>
-              <a:pPr algn="ctr"/>
-              <a:endParaRPr lang="en-US">
-                <a:solidFill>
-                  <a:schemeClr val="lt1"/>
-                </a:solidFill>
-              </a:endParaRPr>
-            </a:p>
-          </p:txBody>
-        </p:sp>
-        <p:sp>
-          <p:nvSpPr>
-            <p:cNvPr id="34" name="Bogen 33"/>
-            <p:cNvSpPr/>
-            <p:nvPr/>
-          </p:nvSpPr>
-          <p:spPr>
-            <a:xfrm rot="8100000">
-              <a:off x="5501399" y="3904831"/>
-              <a:ext cx="2256788" cy="1464833"/>
-            </a:xfrm>
-            <a:prstGeom prst="arc">
-              <a:avLst>
-                <a:gd name="adj1" fmla="val 12979949"/>
-                <a:gd name="adj2" fmla="val 19473341"/>
-              </a:avLst>
-            </a:prstGeom>
-            <a:noFill/>
-            <a:ln w="317500">
-              <a:solidFill>
-                <a:srgbClr val="EDFFFF"/>
-              </a:solidFill>
-            </a:ln>
-          </p:spPr>
-          <p:style>
-            <a:lnRef idx="2">
-              <a:schemeClr val="accent1">
-                <a:shade val="50000"/>
-              </a:schemeClr>
-            </a:lnRef>
-            <a:fillRef idx="1">
-              <a:schemeClr val="accent1"/>
-            </a:fillRef>
-            <a:effectRef idx="0">
-              <a:schemeClr val="accent1"/>
-            </a:effectRef>
-            <a:fontRef idx="minor">
-              <a:schemeClr val="lt1"/>
-            </a:fontRef>
-          </p:style>
-          <p:txBody>
-            <a:bodyPr rtlCol="0" anchor="ctr"/>
-            <a:lstStyle/>
-            <a:p>
-              <a:pPr algn="ctr"/>
-              <a:endParaRPr lang="en-US">
-                <a:solidFill>
-                  <a:schemeClr val="lt1"/>
-                </a:solidFill>
-              </a:endParaRPr>
-            </a:p>
-          </p:txBody>
-        </p:sp>
-        <p:sp>
-          <p:nvSpPr>
-            <p:cNvPr id="35" name="Bogen 34"/>
-            <p:cNvSpPr/>
-            <p:nvPr/>
-          </p:nvSpPr>
-          <p:spPr>
-            <a:xfrm rot="8100000">
-              <a:off x="5651539" y="4340617"/>
-              <a:ext cx="2790756" cy="1464833"/>
-            </a:xfrm>
-            <a:prstGeom prst="arc">
-              <a:avLst>
-                <a:gd name="adj1" fmla="val 12233946"/>
-                <a:gd name="adj2" fmla="val 20199222"/>
-              </a:avLst>
-            </a:prstGeom>
-            <a:noFill/>
-            <a:ln w="317500">
-              <a:solidFill>
-                <a:srgbClr val="EDFFFF"/>
-              </a:solidFill>
-            </a:ln>
-          </p:spPr>
-          <p:style>
-            <a:lnRef idx="2">
-              <a:schemeClr val="accent1">
-                <a:shade val="50000"/>
-              </a:schemeClr>
-            </a:lnRef>
-            <a:fillRef idx="1">
-              <a:schemeClr val="accent1"/>
-            </a:fillRef>
-            <a:effectRef idx="0">
-              <a:schemeClr val="accent1"/>
-            </a:effectRef>
-            <a:fontRef idx="minor">
-              <a:schemeClr val="lt1"/>
-            </a:fontRef>
-          </p:style>
-          <p:txBody>
-            <a:bodyPr rtlCol="0" anchor="ctr"/>
-            <a:lstStyle/>
-            <a:p>
-              <a:pPr algn="ctr"/>
-              <a:endParaRPr lang="en-US">
-                <a:solidFill>
-                  <a:schemeClr val="lt1"/>
-                </a:solidFill>
-              </a:endParaRPr>
+              <a:endParaRPr lang="de-DE"/>
             </a:p>
           </p:txBody>
         </p:sp>

</xml_diff>